<commit_message>
Création du support de la soutenance. Reste à ajouter les graphiques d'évolutions après reprise du taux d'évolution.
</commit_message>
<xml_diff>
--- a/Projet 2 - Analysez des données de systèmes éducatifs/Projet 2.pptx
+++ b/Projet 2 - Analysez des données de systèmes éducatifs/Projet 2.pptx
@@ -18713,13 +18713,8 @@
             <a:pPr lvl="1"/>
             <a:r>
               <a:rPr lang="fr-FR" dirty="0"/>
-              <a:t>SL.UEM.TOTL.ZS – Taux de </a:t>
+              <a:t>SL.UEM.TOTL.ZS – Taux de chômage</a:t>
             </a:r>
-            <a:r>
-              <a:rPr lang="fr-FR" dirty="0" err="1"/>
-              <a:t>chomage</a:t>
-            </a:r>
-            <a:endParaRPr lang="fr-FR" dirty="0"/>
           </a:p>
         </p:txBody>
       </p:sp>
@@ -28494,7 +28489,7 @@
             <a:pPr lvl="1"/>
             <a:r>
               <a:rPr lang="fr-FR" dirty="0"/>
-              <a:t>Calculé selon le rang dans l’étude</a:t>
+              <a:t>Score calculé selon le rang dans l’étude</a:t>
             </a:r>
           </a:p>
           <a:p>
@@ -39864,6 +39859,13 @@
             <a:r>
               <a:rPr lang="fr-FR" dirty="0"/>
               <a:t>Plus de 3600 indicateurs</a:t>
+            </a:r>
+          </a:p>
+          <a:p>
+            <a:pPr lvl="1"/>
+            <a:r>
+              <a:rPr lang="fr-FR" dirty="0"/>
+              <a:t>Thèmes principaux : Education, Population, Infrastructures, Energie, etc.</a:t>
             </a:r>
           </a:p>
           <a:p>

</xml_diff>